<commit_message>
Ppt now has embebed fonts
</commit_message>
<xml_diff>
--- a/Pitches/All That Remains - Presentation.pptx
+++ b/Pitches/All That Remains - Presentation.pptx
@@ -1,6 +1,6 @@
 
 <file path=ppt/presentation.xml><?xml version="1.0" encoding="utf-8"?>
-<p:presentation xmlns:a="http://schemas.openxmlformats.org/drawingml/2006/main" xmlns:r="http://schemas.openxmlformats.org/officeDocument/2006/relationships" xmlns:p="http://schemas.openxmlformats.org/presentationml/2006/main" saveSubsetFonts="1">
+<p:presentation xmlns:a="http://schemas.openxmlformats.org/drawingml/2006/main" xmlns:r="http://schemas.openxmlformats.org/officeDocument/2006/relationships" xmlns:p="http://schemas.openxmlformats.org/presentationml/2006/main" embedTrueTypeFonts="1">
   <p:sldMasterIdLst>
     <p:sldMasterId id="2147483744" r:id="rId1"/>
   </p:sldMasterIdLst>
@@ -14,6 +14,24 @@
   </p:sldIdLst>
   <p:sldSz cx="12192000" cy="6858000"/>
   <p:notesSz cx="6858000" cy="9144000"/>
+  <p:embeddedFontLst>
+    <p:embeddedFont>
+      <p:font typeface="Calibri" panose="020F0502020204030204" pitchFamily="34" charset="0"/>
+      <p:regular r:id="rId8"/>
+      <p:bold r:id="rId9"/>
+      <p:italic r:id="rId10"/>
+      <p:boldItalic r:id="rId11"/>
+    </p:embeddedFont>
+    <p:embeddedFont>
+      <p:font typeface="Calibri Light" panose="020F0302020204030204" pitchFamily="34" charset="0"/>
+      <p:regular r:id="rId12"/>
+      <p:italic r:id="rId13"/>
+    </p:embeddedFont>
+    <p:embeddedFont>
+      <p:font typeface="Old newspaper font" panose="02000500000000000000" pitchFamily="2" charset="0"/>
+      <p:regular r:id="rId14"/>
+    </p:embeddedFont>
+  </p:embeddedFontLst>
   <p:defaultTextStyle>
     <a:defPPr>
       <a:defRPr lang="en-US"/>
@@ -248,7 +266,7 @@
           <a:p>
             <a:fld id="{5C733B4D-A7FA-46D8-BD5A-EB04708D9815}" type="datetimeFigureOut">
               <a:rPr lang="pt-PT" smtClean="0"/>
-              <a:t>18/11/2020</a:t>
+              <a:t>20/11/2020</a:t>
             </a:fld>
             <a:endParaRPr lang="pt-PT" dirty="0"/>
           </a:p>
@@ -418,7 +436,7 @@
           <a:p>
             <a:fld id="{5C733B4D-A7FA-46D8-BD5A-EB04708D9815}" type="datetimeFigureOut">
               <a:rPr lang="pt-PT" smtClean="0"/>
-              <a:t>18/11/2020</a:t>
+              <a:t>20/11/2020</a:t>
             </a:fld>
             <a:endParaRPr lang="pt-PT" dirty="0"/>
           </a:p>
@@ -598,7 +616,7 @@
           <a:p>
             <a:fld id="{5C733B4D-A7FA-46D8-BD5A-EB04708D9815}" type="datetimeFigureOut">
               <a:rPr lang="pt-PT" smtClean="0"/>
-              <a:t>18/11/2020</a:t>
+              <a:t>20/11/2020</a:t>
             </a:fld>
             <a:endParaRPr lang="pt-PT" dirty="0"/>
           </a:p>
@@ -768,7 +786,7 @@
           <a:p>
             <a:fld id="{5C733B4D-A7FA-46D8-BD5A-EB04708D9815}" type="datetimeFigureOut">
               <a:rPr lang="pt-PT" smtClean="0"/>
-              <a:t>18/11/2020</a:t>
+              <a:t>20/11/2020</a:t>
             </a:fld>
             <a:endParaRPr lang="pt-PT" dirty="0"/>
           </a:p>
@@ -1014,7 +1032,7 @@
           <a:p>
             <a:fld id="{5C733B4D-A7FA-46D8-BD5A-EB04708D9815}" type="datetimeFigureOut">
               <a:rPr lang="pt-PT" smtClean="0"/>
-              <a:t>18/11/2020</a:t>
+              <a:t>20/11/2020</a:t>
             </a:fld>
             <a:endParaRPr lang="pt-PT" dirty="0"/>
           </a:p>
@@ -1246,7 +1264,7 @@
           <a:p>
             <a:fld id="{5C733B4D-A7FA-46D8-BD5A-EB04708D9815}" type="datetimeFigureOut">
               <a:rPr lang="pt-PT" smtClean="0"/>
-              <a:t>18/11/2020</a:t>
+              <a:t>20/11/2020</a:t>
             </a:fld>
             <a:endParaRPr lang="pt-PT" dirty="0"/>
           </a:p>
@@ -1613,7 +1631,7 @@
           <a:p>
             <a:fld id="{5C733B4D-A7FA-46D8-BD5A-EB04708D9815}" type="datetimeFigureOut">
               <a:rPr lang="pt-PT" smtClean="0"/>
-              <a:t>18/11/2020</a:t>
+              <a:t>20/11/2020</a:t>
             </a:fld>
             <a:endParaRPr lang="pt-PT" dirty="0"/>
           </a:p>
@@ -1731,7 +1749,7 @@
           <a:p>
             <a:fld id="{5C733B4D-A7FA-46D8-BD5A-EB04708D9815}" type="datetimeFigureOut">
               <a:rPr lang="pt-PT" smtClean="0"/>
-              <a:t>18/11/2020</a:t>
+              <a:t>20/11/2020</a:t>
             </a:fld>
             <a:endParaRPr lang="pt-PT" dirty="0"/>
           </a:p>
@@ -1826,7 +1844,7 @@
           <a:p>
             <a:fld id="{5C733B4D-A7FA-46D8-BD5A-EB04708D9815}" type="datetimeFigureOut">
               <a:rPr lang="pt-PT" smtClean="0"/>
-              <a:t>18/11/2020</a:t>
+              <a:t>20/11/2020</a:t>
             </a:fld>
             <a:endParaRPr lang="pt-PT" dirty="0"/>
           </a:p>
@@ -2103,7 +2121,7 @@
           <a:p>
             <a:fld id="{5C733B4D-A7FA-46D8-BD5A-EB04708D9815}" type="datetimeFigureOut">
               <a:rPr lang="pt-PT" smtClean="0"/>
-              <a:t>18/11/2020</a:t>
+              <a:t>20/11/2020</a:t>
             </a:fld>
             <a:endParaRPr lang="pt-PT" dirty="0"/>
           </a:p>
@@ -2360,7 +2378,7 @@
           <a:p>
             <a:fld id="{5C733B4D-A7FA-46D8-BD5A-EB04708D9815}" type="datetimeFigureOut">
               <a:rPr lang="pt-PT" smtClean="0"/>
-              <a:t>18/11/2020</a:t>
+              <a:t>20/11/2020</a:t>
             </a:fld>
             <a:endParaRPr lang="pt-PT" dirty="0"/>
           </a:p>
@@ -2573,7 +2591,7 @@
           <a:p>
             <a:fld id="{5C733B4D-A7FA-46D8-BD5A-EB04708D9815}" type="datetimeFigureOut">
               <a:rPr lang="pt-PT" smtClean="0"/>
-              <a:t>18/11/2020</a:t>
+              <a:t>20/11/2020</a:t>
             </a:fld>
             <a:endParaRPr lang="pt-PT" dirty="0"/>
           </a:p>

</xml_diff>